<commit_message>
Added more information on tachnical indicators
</commit_message>
<xml_diff>
--- a/CO656-assignment.pptx
+++ b/CO656-assignment.pptx
@@ -122,6 +122,11 @@
       </a:defRPr>
     </a:lvl9pPr>
   </p:defaultTextStyle>
+  <p:extLst>
+    <p:ext uri="{EFAFB233-063F-42B5-8137-9DF3F51BA10A}">
+      <p15:sldGuideLst xmlns:p15="http://schemas.microsoft.com/office/powerpoint/2012/main"/>
+    </p:ext>
+  </p:extLst>
 </p:presentation>
 </file>
 
@@ -1016,6 +1021,28 @@
               <a:rPr lang="en-GB" dirty="0"/>
               <a:t>Momentum did not have any problem</a:t>
             </a:r>
+          </a:p>
+          <a:p>
+            <a:pPr marL="171450" indent="-171450">
+              <a:buFontTx/>
+              <a:buChar char="-"/>
+            </a:pPr>
+            <a:endParaRPr lang="en-GB" dirty="0"/>
+          </a:p>
+          <a:p>
+            <a:pPr marL="171450" indent="-171450">
+              <a:buFontTx/>
+              <a:buChar char="-"/>
+            </a:pPr>
+            <a:r>
+              <a:rPr lang="en-GB" dirty="0"/>
+              <a:t>I also created a excel spreadsheet to check </a:t>
+            </a:r>
+            <a:r>
+              <a:rPr lang="en-GB"/>
+              <a:t>my result. </a:t>
+            </a:r>
+            <a:endParaRPr lang="en-GB" dirty="0"/>
           </a:p>
           <a:p>
             <a:pPr marL="171450" indent="-171450">

</xml_diff>